<commit_message>
Demo video info added
</commit_message>
<xml_diff>
--- a/Documents/finalreport/DefensaTFM.pptx
+++ b/Documents/finalreport/DefensaTFM.pptx
@@ -9250,8 +9250,8 @@
         </p:blipFill>
         <p:spPr bwMode="auto">
           <a:xfrm>
-            <a:off x="1739219" y="2696012"/>
-            <a:ext cx="8269356" cy="4645432"/>
+            <a:off x="2905089" y="2740771"/>
+            <a:ext cx="5937616" cy="3335543"/>
           </a:xfrm>
           <a:prstGeom prst="rect">
             <a:avLst/>
@@ -9268,6 +9268,152 @@
           </a:extLst>
         </p:spPr>
       </p:pic>
+      <p:sp>
+        <p:nvSpPr>
+          <p:cNvPr id="6" name="CuadroTexto 5">
+            <a:extLst>
+              <a:ext uri="{FF2B5EF4-FFF2-40B4-BE49-F238E27FC236}">
+                <a16:creationId xmlns:a16="http://schemas.microsoft.com/office/drawing/2014/main" id="{0D75E2CD-AFA5-40D2-9BAE-A936A897A830}"/>
+              </a:ext>
+            </a:extLst>
+          </p:cNvPr>
+          <p:cNvSpPr txBox="1"/>
+          <p:nvPr/>
+        </p:nvSpPr>
+        <p:spPr>
+          <a:xfrm>
+            <a:off x="5541285" y="6318273"/>
+            <a:ext cx="5997102" cy="369332"/>
+          </a:xfrm>
+          <a:prstGeom prst="rect">
+            <a:avLst/>
+          </a:prstGeom>
+          <a:noFill/>
+        </p:spPr>
+        <p:txBody>
+          <a:bodyPr wrap="square">
+            <a:spAutoFit/>
+          </a:bodyPr>
+          <a:lstStyle/>
+          <a:p>
+            <a:r>
+              <a:rPr lang="es-ES_tradnl" dirty="0">
+                <a:hlinkClick r:id="rId3"/>
+              </a:rPr>
+              <a:t>https://www.youtube.com/watch?v=bNY3aOUXAGs</a:t>
+            </a:r>
+            <a:endParaRPr lang="es-ES_tradnl" dirty="0"/>
+          </a:p>
+        </p:txBody>
+      </p:sp>
+      <p:sp>
+        <p:nvSpPr>
+          <p:cNvPr id="5" name="CuadroTexto 4">
+            <a:extLst>
+              <a:ext uri="{FF2B5EF4-FFF2-40B4-BE49-F238E27FC236}">
+                <a16:creationId xmlns:a16="http://schemas.microsoft.com/office/drawing/2014/main" id="{51F7F6E0-682B-4376-BB33-CAC53B86C6CB}"/>
+              </a:ext>
+            </a:extLst>
+          </p:cNvPr>
+          <p:cNvSpPr txBox="1"/>
+          <p:nvPr/>
+        </p:nvSpPr>
+        <p:spPr>
+          <a:xfrm>
+            <a:off x="885217" y="6318273"/>
+            <a:ext cx="4581728" cy="369332"/>
+          </a:xfrm>
+          <a:prstGeom prst="rect">
+            <a:avLst/>
+          </a:prstGeom>
+          <a:noFill/>
+        </p:spPr>
+        <p:txBody>
+          <a:bodyPr wrap="square" rtlCol="0">
+            <a:spAutoFit/>
+          </a:bodyPr>
+          <a:lstStyle/>
+          <a:p>
+            <a:r>
+              <a:rPr lang="es-ES_tradnl" dirty="0"/>
+              <a:t>Demo 1: Desplegando en Kubernetes local</a:t>
+            </a:r>
+          </a:p>
+        </p:txBody>
+      </p:sp>
+      <p:sp>
+        <p:nvSpPr>
+          <p:cNvPr id="8" name="CuadroTexto 7">
+            <a:extLst>
+              <a:ext uri="{FF2B5EF4-FFF2-40B4-BE49-F238E27FC236}">
+                <a16:creationId xmlns:a16="http://schemas.microsoft.com/office/drawing/2014/main" id="{45EFBB5F-86D0-4E6C-B183-1494DED1B451}"/>
+              </a:ext>
+            </a:extLst>
+          </p:cNvPr>
+          <p:cNvSpPr txBox="1"/>
+          <p:nvPr/>
+        </p:nvSpPr>
+        <p:spPr>
+          <a:xfrm>
+            <a:off x="885217" y="6689032"/>
+            <a:ext cx="4494179" cy="369332"/>
+          </a:xfrm>
+          <a:prstGeom prst="rect">
+            <a:avLst/>
+          </a:prstGeom>
+          <a:noFill/>
+        </p:spPr>
+        <p:txBody>
+          <a:bodyPr wrap="square" rtlCol="0">
+            <a:spAutoFit/>
+          </a:bodyPr>
+          <a:lstStyle/>
+          <a:p>
+            <a:r>
+              <a:rPr lang="es-ES_tradnl" dirty="0"/>
+              <a:t>Demo 2: Desplegando en Okteto</a:t>
+            </a:r>
+          </a:p>
+        </p:txBody>
+      </p:sp>
+      <p:sp>
+        <p:nvSpPr>
+          <p:cNvPr id="10" name="CuadroTexto 9">
+            <a:extLst>
+              <a:ext uri="{FF2B5EF4-FFF2-40B4-BE49-F238E27FC236}">
+                <a16:creationId xmlns:a16="http://schemas.microsoft.com/office/drawing/2014/main" id="{7BF3202D-9545-4497-BEF0-A04DE41BA3FC}"/>
+              </a:ext>
+            </a:extLst>
+          </p:cNvPr>
+          <p:cNvSpPr txBox="1"/>
+          <p:nvPr/>
+        </p:nvSpPr>
+        <p:spPr>
+          <a:xfrm>
+            <a:off x="5541285" y="6689032"/>
+            <a:ext cx="5997102" cy="369332"/>
+          </a:xfrm>
+          <a:prstGeom prst="rect">
+            <a:avLst/>
+          </a:prstGeom>
+          <a:noFill/>
+        </p:spPr>
+        <p:txBody>
+          <a:bodyPr wrap="square">
+            <a:spAutoFit/>
+          </a:bodyPr>
+          <a:lstStyle/>
+          <a:p>
+            <a:r>
+              <a:rPr lang="es-ES_tradnl" dirty="0">
+                <a:hlinkClick r:id="rId4"/>
+              </a:rPr>
+              <a:t>https://www.youtube.com/watch?v=aDVbC28yOyI</a:t>
+            </a:r>
+            <a:endParaRPr lang="es-ES_tradnl" dirty="0"/>
+          </a:p>
+        </p:txBody>
+      </p:sp>
     </p:spTree>
     <p:extLst>
       <p:ext uri="{BB962C8B-B14F-4D97-AF65-F5344CB8AC3E}">

</xml_diff>